<commit_message>
Auditory Steady-State: figures for blog post
</commit_message>
<xml_diff>
--- a/Data/2015-01-24 Auditory Steady State/2015-01-24 ASSR Figures.pptx
+++ b/Data/2015-01-24 Auditory Steady State/2015-01-24 ASSR Figures.pptx
@@ -9,6 +9,11 @@
     <p:sldId id="261" r:id="rId3"/>
     <p:sldId id="262" r:id="rId4"/>
     <p:sldId id="263" r:id="rId5"/>
+    <p:sldId id="264" r:id="rId6"/>
+    <p:sldId id="265" r:id="rId7"/>
+    <p:sldId id="266" r:id="rId8"/>
+    <p:sldId id="267" r:id="rId9"/>
+    <p:sldId id="268" r:id="rId10"/>
   </p:sldIdLst>
   <p:sldSz cx="9144000" cy="6858000" type="screen4x3"/>
   <p:notesSz cx="6858000" cy="9144000"/>
@@ -4059,6 +4064,1397 @@
 </p:sld>
 </file>
 
+<file path=ppt/slides/slide5.xml><?xml version="1.0" encoding="utf-8"?>
+<p:sld xmlns:a="http://schemas.openxmlformats.org/drawingml/2006/main" xmlns:r="http://schemas.openxmlformats.org/officeDocument/2006/relationships" xmlns:p="http://schemas.openxmlformats.org/presentationml/2006/main">
+  <p:cSld>
+    <p:spTree>
+      <p:nvGrpSpPr>
+        <p:cNvPr id="1" name=""/>
+        <p:cNvGrpSpPr/>
+        <p:nvPr/>
+      </p:nvGrpSpPr>
+      <p:grpSpPr>
+        <a:xfrm>
+          <a:off x="0" y="0"/>
+          <a:ext cx="0" cy="0"/>
+          <a:chOff x="0" y="0"/>
+          <a:chExt cx="0" cy="0"/>
+        </a:xfrm>
+      </p:grpSpPr>
+      <p:sp>
+        <p:nvSpPr>
+          <p:cNvPr id="5" name="Rectangle 4"/>
+          <p:cNvSpPr/>
+          <p:nvPr/>
+        </p:nvSpPr>
+        <p:spPr>
+          <a:xfrm>
+            <a:off x="1828800" y="812578"/>
+            <a:ext cx="5334000" cy="3683222"/>
+          </a:xfrm>
+          <a:prstGeom prst="rect">
+            <a:avLst/>
+          </a:prstGeom>
+          <a:solidFill>
+            <a:schemeClr val="bg1"/>
+          </a:solidFill>
+          <a:ln>
+            <a:solidFill>
+              <a:schemeClr val="bg1"/>
+            </a:solidFill>
+          </a:ln>
+        </p:spPr>
+        <p:style>
+          <a:lnRef idx="2">
+            <a:schemeClr val="accent1">
+              <a:shade val="50000"/>
+            </a:schemeClr>
+          </a:lnRef>
+          <a:fillRef idx="1">
+            <a:schemeClr val="accent1"/>
+          </a:fillRef>
+          <a:effectRef idx="0">
+            <a:schemeClr val="accent1"/>
+          </a:effectRef>
+          <a:fontRef idx="minor">
+            <a:schemeClr val="lt1"/>
+          </a:fontRef>
+        </p:style>
+        <p:txBody>
+          <a:bodyPr rtlCol="0" anchor="ctr"/>
+          <a:lstStyle/>
+          <a:p>
+            <a:pPr algn="ctr"/>
+            <a:endParaRPr lang="en-US"/>
+          </a:p>
+        </p:txBody>
+      </p:sp>
+      <p:grpSp>
+        <p:nvGrpSpPr>
+          <p:cNvPr id="4" name="Group 3"/>
+          <p:cNvGrpSpPr/>
+          <p:nvPr/>
+        </p:nvGrpSpPr>
+        <p:grpSpPr>
+          <a:xfrm>
+            <a:off x="1596544" y="914400"/>
+            <a:ext cx="5510694" cy="3479800"/>
+            <a:chOff x="1596544" y="914400"/>
+            <a:chExt cx="5510694" cy="3479800"/>
+          </a:xfrm>
+        </p:grpSpPr>
+        <p:pic>
+          <p:nvPicPr>
+            <p:cNvPr id="1030" name="Picture 6" descr="C:\Users\T410\Desktop\2015-01-24  Auditory Steady State Response (EEG Hacker, OpenBCI)\IMG_3870-001.JPG"/>
+            <p:cNvPicPr>
+              <a:picLocks noChangeAspect="1" noChangeArrowheads="1"/>
+            </p:cNvPicPr>
+            <p:nvPr/>
+          </p:nvPicPr>
+          <p:blipFill>
+            <a:blip r:embed="rId2">
+              <a:extLst>
+                <a:ext uri="{28A0092B-C50C-407E-A947-70E740481C1C}">
+                  <a14:useLocalDpi xmlns:a14="http://schemas.microsoft.com/office/drawing/2010/main" val="0"/>
+                </a:ext>
+              </a:extLst>
+            </a:blip>
+            <a:srcRect/>
+            <a:stretch>
+              <a:fillRect/>
+            </a:stretch>
+          </p:blipFill>
+          <p:spPr bwMode="auto">
+            <a:xfrm>
+              <a:off x="1905000" y="914400"/>
+              <a:ext cx="5202238" cy="3479800"/>
+            </a:xfrm>
+            <a:prstGeom prst="rect">
+              <a:avLst/>
+            </a:prstGeom>
+            <a:noFill/>
+            <a:extLst>
+              <a:ext uri="{909E8E84-426E-40DD-AFC4-6F175D3DCCD1}">
+                <a14:hiddenFill xmlns:a14="http://schemas.microsoft.com/office/drawing/2010/main">
+                  <a:solidFill>
+                    <a:srgbClr val="FFFFFF"/>
+                  </a:solidFill>
+                </a14:hiddenFill>
+              </a:ext>
+            </a:extLst>
+          </p:spPr>
+        </p:pic>
+        <p:sp>
+          <p:nvSpPr>
+            <p:cNvPr id="3" name="Oval 2"/>
+            <p:cNvSpPr/>
+            <p:nvPr/>
+          </p:nvSpPr>
+          <p:spPr>
+            <a:xfrm rot="19997589">
+              <a:off x="1596544" y="951712"/>
+              <a:ext cx="3113397" cy="2416704"/>
+            </a:xfrm>
+            <a:prstGeom prst="ellipse">
+              <a:avLst/>
+            </a:prstGeom>
+            <a:solidFill>
+              <a:schemeClr val="tx1">
+                <a:alpha val="61000"/>
+              </a:schemeClr>
+            </a:solidFill>
+            <a:ln>
+              <a:noFill/>
+            </a:ln>
+            <a:effectLst>
+              <a:softEdge rad="393700"/>
+            </a:effectLst>
+          </p:spPr>
+          <p:style>
+            <a:lnRef idx="2">
+              <a:schemeClr val="accent1">
+                <a:shade val="50000"/>
+              </a:schemeClr>
+            </a:lnRef>
+            <a:fillRef idx="1">
+              <a:schemeClr val="accent1"/>
+            </a:fillRef>
+            <a:effectRef idx="0">
+              <a:schemeClr val="accent1"/>
+            </a:effectRef>
+            <a:fontRef idx="minor">
+              <a:schemeClr val="lt1"/>
+            </a:fontRef>
+          </p:style>
+          <p:txBody>
+            <a:bodyPr rtlCol="0" anchor="ctr"/>
+            <a:lstStyle/>
+            <a:p>
+              <a:pPr algn="ctr"/>
+              <a:endParaRPr lang="en-US"/>
+            </a:p>
+          </p:txBody>
+        </p:sp>
+        <p:sp>
+          <p:nvSpPr>
+            <p:cNvPr id="2" name="Rectangle 1"/>
+            <p:cNvSpPr/>
+            <p:nvPr/>
+          </p:nvSpPr>
+          <p:spPr>
+            <a:xfrm rot="20128561">
+              <a:off x="2440457" y="2366528"/>
+              <a:ext cx="2634760" cy="1684044"/>
+            </a:xfrm>
+            <a:prstGeom prst="rect">
+              <a:avLst/>
+            </a:prstGeom>
+            <a:noFill/>
+          </p:spPr>
+          <p:txBody>
+            <a:bodyPr wrap="none" lIns="91440" tIns="45720" rIns="91440" bIns="45720">
+              <a:prstTxWarp prst="textArchUp">
+                <a:avLst/>
+              </a:prstTxWarp>
+              <a:spAutoFit/>
+            </a:bodyPr>
+            <a:lstStyle/>
+            <a:p>
+              <a:pPr algn="ctr">
+                <a:lnSpc>
+                  <a:spcPct val="90000"/>
+                </a:lnSpc>
+              </a:pPr>
+              <a:r>
+                <a:rPr lang="en-US" sz="4800" b="1" dirty="0" smtClean="0">
+                  <a:ln w="1905"/>
+                  <a:gradFill>
+                    <a:gsLst>
+                      <a:gs pos="0">
+                        <a:srgbClr val="FF2F05"/>
+                      </a:gs>
+                      <a:gs pos="100000">
+                        <a:srgbClr val="FF3701"/>
+                      </a:gs>
+                    </a:gsLst>
+                    <a:lin ang="5400000"/>
+                  </a:gradFill>
+                  <a:effectLst>
+                    <a:outerShdw blurRad="50800" dist="38100" dir="18900000" algn="bl" rotWithShape="0">
+                      <a:prstClr val="black">
+                        <a:alpha val="40000"/>
+                      </a:prstClr>
+                    </a:outerShdw>
+                  </a:effectLst>
+                </a:rPr>
+                <a:t>Brain got</a:t>
+              </a:r>
+            </a:p>
+            <a:p>
+              <a:pPr algn="ctr">
+                <a:lnSpc>
+                  <a:spcPct val="90000"/>
+                </a:lnSpc>
+              </a:pPr>
+              <a:r>
+                <a:rPr lang="en-US" sz="4800" b="1" cap="none" dirty="0" smtClean="0">
+                  <a:ln w="1905"/>
+                  <a:gradFill>
+                    <a:gsLst>
+                      <a:gs pos="0">
+                        <a:srgbClr val="FF2F05"/>
+                      </a:gs>
+                      <a:gs pos="100000">
+                        <a:srgbClr val="FF3701"/>
+                      </a:gs>
+                    </a:gsLst>
+                    <a:lin ang="5400000"/>
+                  </a:gradFill>
+                  <a:effectLst>
+                    <a:outerShdw blurRad="50800" dist="38100" dir="18900000" algn="bl" rotWithShape="0">
+                      <a:prstClr val="black">
+                        <a:alpha val="40000"/>
+                      </a:prstClr>
+                    </a:outerShdw>
+                  </a:effectLst>
+                </a:rPr>
+                <a:t>Beats?</a:t>
+              </a:r>
+              <a:endParaRPr lang="en-US" sz="4800" b="1" cap="none" dirty="0">
+                <a:ln w="1905"/>
+                <a:gradFill>
+                  <a:gsLst>
+                    <a:gs pos="0">
+                      <a:srgbClr val="FF2F05"/>
+                    </a:gs>
+                    <a:gs pos="100000">
+                      <a:srgbClr val="FF3701"/>
+                    </a:gs>
+                  </a:gsLst>
+                  <a:lin ang="5400000"/>
+                </a:gradFill>
+                <a:effectLst>
+                  <a:outerShdw blurRad="50800" dist="38100" dir="18900000" algn="bl" rotWithShape="0">
+                    <a:prstClr val="black">
+                      <a:alpha val="40000"/>
+                    </a:prstClr>
+                  </a:outerShdw>
+                </a:effectLst>
+              </a:endParaRPr>
+            </a:p>
+          </p:txBody>
+        </p:sp>
+      </p:grpSp>
+    </p:spTree>
+    <p:extLst>
+      <p:ext uri="{BB962C8B-B14F-4D97-AF65-F5344CB8AC3E}">
+        <p14:creationId xmlns:p14="http://schemas.microsoft.com/office/powerpoint/2010/main" val="4259952413"/>
+      </p:ext>
+    </p:extLst>
+  </p:cSld>
+  <p:clrMapOvr>
+    <a:masterClrMapping/>
+  </p:clrMapOvr>
+</p:sld>
+</file>
+
+<file path=ppt/slides/slide6.xml><?xml version="1.0" encoding="utf-8"?>
+<p:sld xmlns:a="http://schemas.openxmlformats.org/drawingml/2006/main" xmlns:r="http://schemas.openxmlformats.org/officeDocument/2006/relationships" xmlns:p="http://schemas.openxmlformats.org/presentationml/2006/main">
+  <p:cSld>
+    <p:spTree>
+      <p:nvGrpSpPr>
+        <p:cNvPr id="1" name=""/>
+        <p:cNvGrpSpPr/>
+        <p:nvPr/>
+      </p:nvGrpSpPr>
+      <p:grpSpPr>
+        <a:xfrm>
+          <a:off x="0" y="0"/>
+          <a:ext cx="0" cy="0"/>
+          <a:chOff x="0" y="0"/>
+          <a:chExt cx="0" cy="0"/>
+        </a:xfrm>
+      </p:grpSpPr>
+      <p:pic>
+        <p:nvPicPr>
+          <p:cNvPr id="2050" name="Picture 2"/>
+          <p:cNvPicPr>
+            <a:picLocks noChangeAspect="1" noChangeArrowheads="1"/>
+          </p:cNvPicPr>
+          <p:nvPr/>
+        </p:nvPicPr>
+        <p:blipFill rotWithShape="1">
+          <a:blip r:embed="rId2">
+            <a:extLst>
+              <a:ext uri="{28A0092B-C50C-407E-A947-70E740481C1C}">
+                <a14:useLocalDpi xmlns:a14="http://schemas.microsoft.com/office/drawing/2010/main" val="0"/>
+              </a:ext>
+            </a:extLst>
+          </a:blip>
+          <a:srcRect l="4573" t="1490" b="3696"/>
+          <a:stretch/>
+        </p:blipFill>
+        <p:spPr bwMode="auto">
+          <a:xfrm>
+            <a:off x="2238375" y="1205344"/>
+            <a:ext cx="5200650" cy="3461905"/>
+          </a:xfrm>
+          <a:prstGeom prst="rect">
+            <a:avLst/>
+          </a:prstGeom>
+          <a:noFill/>
+          <a:ln>
+            <a:noFill/>
+          </a:ln>
+          <a:effectLst/>
+          <a:extLst>
+            <a:ext uri="{909E8E84-426E-40DD-AFC4-6F175D3DCCD1}">
+              <a14:hiddenFill xmlns:a14="http://schemas.microsoft.com/office/drawing/2010/main">
+                <a:solidFill>
+                  <a:schemeClr val="accent1"/>
+                </a:solidFill>
+              </a14:hiddenFill>
+            </a:ext>
+            <a:ext uri="{91240B29-F687-4F45-9708-019B960494DF}">
+              <a14:hiddenLine xmlns:a14="http://schemas.microsoft.com/office/drawing/2010/main" w="9525">
+                <a:solidFill>
+                  <a:schemeClr val="tx1"/>
+                </a:solidFill>
+                <a:miter lim="800000"/>
+                <a:headEnd/>
+                <a:tailEnd/>
+              </a14:hiddenLine>
+            </a:ext>
+            <a:ext uri="{AF507438-7753-43E0-B8FC-AC1667EBCBE1}">
+              <a14:hiddenEffects xmlns:a14="http://schemas.microsoft.com/office/drawing/2010/main">
+                <a:effectLst>
+                  <a:outerShdw dist="35921" dir="2700000" algn="ctr" rotWithShape="0">
+                    <a:schemeClr val="bg2"/>
+                  </a:outerShdw>
+                </a:effectLst>
+              </a14:hiddenEffects>
+            </a:ext>
+          </a:extLst>
+        </p:spPr>
+      </p:pic>
+    </p:spTree>
+    <p:extLst>
+      <p:ext uri="{BB962C8B-B14F-4D97-AF65-F5344CB8AC3E}">
+        <p14:creationId xmlns:p14="http://schemas.microsoft.com/office/powerpoint/2010/main" val="4286019860"/>
+      </p:ext>
+    </p:extLst>
+  </p:cSld>
+  <p:clrMapOvr>
+    <a:masterClrMapping/>
+  </p:clrMapOvr>
+</p:sld>
+</file>
+
+<file path=ppt/slides/slide7.xml><?xml version="1.0" encoding="utf-8"?>
+<p:sld xmlns:a="http://schemas.openxmlformats.org/drawingml/2006/main" xmlns:r="http://schemas.openxmlformats.org/officeDocument/2006/relationships" xmlns:p="http://schemas.openxmlformats.org/presentationml/2006/main">
+  <p:cSld>
+    <p:spTree>
+      <p:nvGrpSpPr>
+        <p:cNvPr id="1" name=""/>
+        <p:cNvGrpSpPr/>
+        <p:nvPr/>
+      </p:nvGrpSpPr>
+      <p:grpSpPr>
+        <a:xfrm>
+          <a:off x="0" y="0"/>
+          <a:ext cx="0" cy="0"/>
+          <a:chOff x="0" y="0"/>
+          <a:chExt cx="0" cy="0"/>
+        </a:xfrm>
+      </p:grpSpPr>
+      <p:grpSp>
+        <p:nvGrpSpPr>
+          <p:cNvPr id="12" name="Group 11"/>
+          <p:cNvGrpSpPr/>
+          <p:nvPr/>
+        </p:nvGrpSpPr>
+        <p:grpSpPr>
+          <a:xfrm>
+            <a:off x="874713" y="990600"/>
+            <a:ext cx="8269287" cy="4510088"/>
+            <a:chOff x="874713" y="990600"/>
+            <a:chExt cx="8269287" cy="4510088"/>
+          </a:xfrm>
+        </p:grpSpPr>
+        <p:grpSp>
+          <p:nvGrpSpPr>
+            <p:cNvPr id="3" name="Group 2"/>
+            <p:cNvGrpSpPr/>
+            <p:nvPr/>
+          </p:nvGrpSpPr>
+          <p:grpSpPr>
+            <a:xfrm>
+              <a:off x="874713" y="990600"/>
+              <a:ext cx="8269287" cy="4510088"/>
+              <a:chOff x="874713" y="990600"/>
+              <a:chExt cx="8269287" cy="4510088"/>
+            </a:xfrm>
+          </p:grpSpPr>
+          <p:sp>
+            <p:nvSpPr>
+              <p:cNvPr id="2" name="Rectangle 1"/>
+              <p:cNvSpPr/>
+              <p:nvPr/>
+            </p:nvSpPr>
+            <p:spPr>
+              <a:xfrm>
+                <a:off x="874713" y="990600"/>
+                <a:ext cx="8269287" cy="4510088"/>
+              </a:xfrm>
+              <a:prstGeom prst="rect">
+                <a:avLst/>
+              </a:prstGeom>
+              <a:solidFill>
+                <a:schemeClr val="bg1"/>
+              </a:solidFill>
+              <a:ln>
+                <a:solidFill>
+                  <a:schemeClr val="bg1"/>
+                </a:solidFill>
+              </a:ln>
+            </p:spPr>
+            <p:style>
+              <a:lnRef idx="2">
+                <a:schemeClr val="accent1">
+                  <a:shade val="50000"/>
+                </a:schemeClr>
+              </a:lnRef>
+              <a:fillRef idx="1">
+                <a:schemeClr val="accent1"/>
+              </a:fillRef>
+              <a:effectRef idx="0">
+                <a:schemeClr val="accent1"/>
+              </a:effectRef>
+              <a:fontRef idx="minor">
+                <a:schemeClr val="lt1"/>
+              </a:fontRef>
+            </p:style>
+            <p:txBody>
+              <a:bodyPr rtlCol="0" anchor="ctr"/>
+              <a:lstStyle/>
+              <a:p>
+                <a:pPr algn="ctr"/>
+                <a:endParaRPr lang="en-US"/>
+              </a:p>
+            </p:txBody>
+          </p:sp>
+          <p:pic>
+            <p:nvPicPr>
+              <p:cNvPr id="3074" name="Picture 2" descr="C:\Users\T410\Desktop\2015-01-24  Auditory Steady State Response (EEG Hacker, OpenBCI)\Results-EyesClosed.png"/>
+              <p:cNvPicPr>
+                <a:picLocks noChangeAspect="1" noChangeArrowheads="1"/>
+              </p:cNvPicPr>
+              <p:nvPr/>
+            </p:nvPicPr>
+            <p:blipFill>
+              <a:blip r:embed="rId2">
+                <a:extLst>
+                  <a:ext uri="{28A0092B-C50C-407E-A947-70E740481C1C}">
+                    <a14:useLocalDpi xmlns:a14="http://schemas.microsoft.com/office/drawing/2010/main" val="0"/>
+                  </a:ext>
+                </a:extLst>
+              </a:blip>
+              <a:srcRect/>
+              <a:stretch>
+                <a:fillRect/>
+              </a:stretch>
+            </p:blipFill>
+            <p:spPr bwMode="auto">
+              <a:xfrm>
+                <a:off x="874713" y="990600"/>
+                <a:ext cx="8269287" cy="4510088"/>
+              </a:xfrm>
+              <a:prstGeom prst="rect">
+                <a:avLst/>
+              </a:prstGeom>
+              <a:noFill/>
+              <a:extLst>
+                <a:ext uri="{909E8E84-426E-40DD-AFC4-6F175D3DCCD1}">
+                  <a14:hiddenFill xmlns:a14="http://schemas.microsoft.com/office/drawing/2010/main">
+                    <a:solidFill>
+                      <a:srgbClr val="FFFFFF"/>
+                    </a:solidFill>
+                  </a14:hiddenFill>
+                </a:ext>
+              </a:extLst>
+            </p:spPr>
+          </p:pic>
+        </p:grpSp>
+        <p:sp>
+          <p:nvSpPr>
+            <p:cNvPr id="5" name="TextBox 4"/>
+            <p:cNvSpPr txBox="1"/>
+            <p:nvPr/>
+          </p:nvSpPr>
+          <p:spPr>
+            <a:xfrm>
+              <a:off x="4216216" y="1737053"/>
+              <a:ext cx="1167307" cy="461665"/>
+            </a:xfrm>
+            <a:prstGeom prst="rect">
+              <a:avLst/>
+            </a:prstGeom>
+            <a:solidFill>
+              <a:schemeClr val="bg1"/>
+            </a:solidFill>
+          </p:spPr>
+          <p:txBody>
+            <a:bodyPr wrap="none" rtlCol="0">
+              <a:spAutoFit/>
+            </a:bodyPr>
+            <a:lstStyle/>
+            <a:p>
+              <a:pPr algn="ctr"/>
+              <a:r>
+                <a:rPr lang="en-US" sz="1200" b="1" dirty="0" smtClean="0">
+                  <a:latin typeface="Arial" panose="020B0604020202020204" pitchFamily="34" charset="0"/>
+                  <a:cs typeface="Arial" panose="020B0604020202020204" pitchFamily="34" charset="0"/>
+                </a:rPr>
+                <a:t>No Response</a:t>
+              </a:r>
+            </a:p>
+            <a:p>
+              <a:pPr algn="ctr"/>
+              <a:r>
+                <a:rPr lang="en-US" sz="1200" b="1" dirty="0" smtClean="0">
+                  <a:latin typeface="Arial" panose="020B0604020202020204" pitchFamily="34" charset="0"/>
+                  <a:cs typeface="Arial" panose="020B0604020202020204" pitchFamily="34" charset="0"/>
+                </a:rPr>
+                <a:t>38-42 Hz</a:t>
+              </a:r>
+              <a:endParaRPr lang="en-US" sz="1200" b="1" dirty="0">
+                <a:latin typeface="Arial" panose="020B0604020202020204" pitchFamily="34" charset="0"/>
+                <a:cs typeface="Arial" panose="020B0604020202020204" pitchFamily="34" charset="0"/>
+              </a:endParaRPr>
+            </a:p>
+          </p:txBody>
+        </p:sp>
+        <p:grpSp>
+          <p:nvGrpSpPr>
+            <p:cNvPr id="10" name="Group 9"/>
+            <p:cNvGrpSpPr/>
+            <p:nvPr/>
+          </p:nvGrpSpPr>
+          <p:grpSpPr>
+            <a:xfrm>
+              <a:off x="1871331" y="2243468"/>
+              <a:ext cx="5832614" cy="533400"/>
+              <a:chOff x="1828799" y="2286000"/>
+              <a:chExt cx="5832614" cy="533400"/>
+            </a:xfrm>
+          </p:grpSpPr>
+          <p:sp>
+            <p:nvSpPr>
+              <p:cNvPr id="7" name="Right Brace 6"/>
+              <p:cNvSpPr/>
+              <p:nvPr/>
+            </p:nvSpPr>
+            <p:spPr>
+              <a:xfrm>
+                <a:off x="7467600" y="2296180"/>
+                <a:ext cx="193813" cy="523220"/>
+              </a:xfrm>
+              <a:prstGeom prst="rightBrace">
+                <a:avLst>
+                  <a:gd name="adj1" fmla="val 29203"/>
+                  <a:gd name="adj2" fmla="val 50000"/>
+                </a:avLst>
+              </a:prstGeom>
+              <a:noFill/>
+              <a:ln w="57150">
+                <a:solidFill>
+                  <a:schemeClr val="bg1"/>
+                </a:solidFill>
+              </a:ln>
+            </p:spPr>
+            <p:style>
+              <a:lnRef idx="1">
+                <a:schemeClr val="accent1"/>
+              </a:lnRef>
+              <a:fillRef idx="0">
+                <a:schemeClr val="accent1"/>
+              </a:fillRef>
+              <a:effectRef idx="0">
+                <a:schemeClr val="accent1"/>
+              </a:effectRef>
+              <a:fontRef idx="minor">
+                <a:schemeClr val="tx1"/>
+              </a:fontRef>
+            </p:style>
+            <p:txBody>
+              <a:bodyPr rtlCol="0" anchor="ctr"/>
+              <a:lstStyle/>
+              <a:p>
+                <a:pPr algn="ctr"/>
+                <a:endParaRPr lang="en-US" sz="1600"/>
+              </a:p>
+            </p:txBody>
+          </p:sp>
+          <p:sp>
+            <p:nvSpPr>
+              <p:cNvPr id="8" name="Right Brace 7"/>
+              <p:cNvSpPr/>
+              <p:nvPr/>
+            </p:nvSpPr>
+            <p:spPr>
+              <a:xfrm flipH="1">
+                <a:off x="1828799" y="2296180"/>
+                <a:ext cx="193813" cy="523220"/>
+              </a:xfrm>
+              <a:prstGeom prst="rightBrace">
+                <a:avLst>
+                  <a:gd name="adj1" fmla="val 29203"/>
+                  <a:gd name="adj2" fmla="val 50000"/>
+                </a:avLst>
+              </a:prstGeom>
+              <a:noFill/>
+              <a:ln w="57150">
+                <a:solidFill>
+                  <a:schemeClr val="bg1"/>
+                </a:solidFill>
+              </a:ln>
+            </p:spPr>
+            <p:style>
+              <a:lnRef idx="1">
+                <a:schemeClr val="accent1"/>
+              </a:lnRef>
+              <a:fillRef idx="0">
+                <a:schemeClr val="accent1"/>
+              </a:fillRef>
+              <a:effectRef idx="0">
+                <a:schemeClr val="accent1"/>
+              </a:effectRef>
+              <a:fontRef idx="minor">
+                <a:schemeClr val="tx1"/>
+              </a:fontRef>
+            </p:style>
+            <p:txBody>
+              <a:bodyPr rtlCol="0" anchor="ctr"/>
+              <a:lstStyle/>
+              <a:p>
+                <a:pPr algn="ctr"/>
+                <a:endParaRPr lang="en-US"/>
+              </a:p>
+            </p:txBody>
+          </p:sp>
+          <p:cxnSp>
+            <p:nvCxnSpPr>
+              <p:cNvPr id="9" name="Straight Connector 8"/>
+              <p:cNvCxnSpPr/>
+              <p:nvPr/>
+            </p:nvCxnSpPr>
+            <p:spPr>
+              <a:xfrm>
+                <a:off x="2133600" y="2286000"/>
+                <a:ext cx="5257800" cy="0"/>
+              </a:xfrm>
+              <a:prstGeom prst="line">
+                <a:avLst/>
+              </a:prstGeom>
+              <a:ln w="28575">
+                <a:solidFill>
+                  <a:schemeClr val="bg1"/>
+                </a:solidFill>
+                <a:prstDash val="dash"/>
+              </a:ln>
+            </p:spPr>
+            <p:style>
+              <a:lnRef idx="1">
+                <a:schemeClr val="accent1"/>
+              </a:lnRef>
+              <a:fillRef idx="0">
+                <a:schemeClr val="accent1"/>
+              </a:fillRef>
+              <a:effectRef idx="0">
+                <a:schemeClr val="accent1"/>
+              </a:effectRef>
+              <a:fontRef idx="minor">
+                <a:schemeClr val="tx1"/>
+              </a:fontRef>
+            </p:style>
+          </p:cxnSp>
+          <p:cxnSp>
+            <p:nvCxnSpPr>
+              <p:cNvPr id="11" name="Straight Connector 10"/>
+              <p:cNvCxnSpPr/>
+              <p:nvPr/>
+            </p:nvCxnSpPr>
+            <p:spPr>
+              <a:xfrm>
+                <a:off x="2133600" y="2819400"/>
+                <a:ext cx="5257800" cy="0"/>
+              </a:xfrm>
+              <a:prstGeom prst="line">
+                <a:avLst/>
+              </a:prstGeom>
+              <a:ln w="28575">
+                <a:solidFill>
+                  <a:schemeClr val="bg1"/>
+                </a:solidFill>
+                <a:prstDash val="dash"/>
+              </a:ln>
+            </p:spPr>
+            <p:style>
+              <a:lnRef idx="1">
+                <a:schemeClr val="accent1"/>
+              </a:lnRef>
+              <a:fillRef idx="0">
+                <a:schemeClr val="accent1"/>
+              </a:fillRef>
+              <a:effectRef idx="0">
+                <a:schemeClr val="accent1"/>
+              </a:effectRef>
+              <a:fontRef idx="minor">
+                <a:schemeClr val="tx1"/>
+              </a:fontRef>
+            </p:style>
+          </p:cxnSp>
+        </p:grpSp>
+        <p:sp>
+          <p:nvSpPr>
+            <p:cNvPr id="13" name="TextBox 12"/>
+            <p:cNvSpPr txBox="1"/>
+            <p:nvPr/>
+          </p:nvSpPr>
+          <p:spPr>
+            <a:xfrm>
+              <a:off x="4246675" y="3810402"/>
+              <a:ext cx="1106392" cy="461665"/>
+            </a:xfrm>
+            <a:prstGeom prst="rect">
+              <a:avLst/>
+            </a:prstGeom>
+            <a:solidFill>
+              <a:schemeClr val="bg1"/>
+            </a:solidFill>
+          </p:spPr>
+          <p:txBody>
+            <a:bodyPr wrap="none" rtlCol="0">
+              <a:spAutoFit/>
+            </a:bodyPr>
+            <a:lstStyle/>
+            <a:p>
+              <a:pPr algn="ctr"/>
+              <a:r>
+                <a:rPr lang="en-US" sz="1200" b="1" dirty="0" smtClean="0">
+                  <a:latin typeface="Arial" panose="020B0604020202020204" pitchFamily="34" charset="0"/>
+                  <a:cs typeface="Arial" panose="020B0604020202020204" pitchFamily="34" charset="0"/>
+                </a:rPr>
+                <a:t>Eyes-Closed</a:t>
+              </a:r>
+            </a:p>
+            <a:p>
+              <a:pPr algn="ctr"/>
+              <a:r>
+                <a:rPr lang="en-US" sz="1200" b="1" dirty="0" smtClean="0">
+                  <a:latin typeface="Arial" panose="020B0604020202020204" pitchFamily="34" charset="0"/>
+                  <a:cs typeface="Arial" panose="020B0604020202020204" pitchFamily="34" charset="0"/>
+                </a:rPr>
+                <a:t>Alpha</a:t>
+              </a:r>
+              <a:endParaRPr lang="en-US" sz="1200" b="1" dirty="0">
+                <a:latin typeface="Arial" panose="020B0604020202020204" pitchFamily="34" charset="0"/>
+                <a:cs typeface="Arial" panose="020B0604020202020204" pitchFamily="34" charset="0"/>
+              </a:endParaRPr>
+            </a:p>
+          </p:txBody>
+        </p:sp>
+      </p:grpSp>
+    </p:spTree>
+    <p:extLst>
+      <p:ext uri="{BB962C8B-B14F-4D97-AF65-F5344CB8AC3E}">
+        <p14:creationId xmlns:p14="http://schemas.microsoft.com/office/powerpoint/2010/main" val="3952789116"/>
+      </p:ext>
+    </p:extLst>
+  </p:cSld>
+  <p:clrMapOvr>
+    <a:masterClrMapping/>
+  </p:clrMapOvr>
+</p:sld>
+</file>
+
+<file path=ppt/slides/slide8.xml><?xml version="1.0" encoding="utf-8"?>
+<p:sld xmlns:a="http://schemas.openxmlformats.org/drawingml/2006/main" xmlns:r="http://schemas.openxmlformats.org/officeDocument/2006/relationships" xmlns:p="http://schemas.openxmlformats.org/presentationml/2006/main">
+  <p:cSld>
+    <p:spTree>
+      <p:nvGrpSpPr>
+        <p:cNvPr id="1" name=""/>
+        <p:cNvGrpSpPr/>
+        <p:nvPr/>
+      </p:nvGrpSpPr>
+      <p:grpSpPr>
+        <a:xfrm>
+          <a:off x="0" y="0"/>
+          <a:ext cx="0" cy="0"/>
+          <a:chOff x="0" y="0"/>
+          <a:chExt cx="0" cy="0"/>
+        </a:xfrm>
+      </p:grpSpPr>
+      <p:grpSp>
+        <p:nvGrpSpPr>
+          <p:cNvPr id="4" name="Group 3"/>
+          <p:cNvGrpSpPr/>
+          <p:nvPr/>
+        </p:nvGrpSpPr>
+        <p:grpSpPr>
+          <a:xfrm>
+            <a:off x="685800" y="990600"/>
+            <a:ext cx="8269288" cy="4510087"/>
+            <a:chOff x="685800" y="990600"/>
+            <a:chExt cx="8269288" cy="4510087"/>
+          </a:xfrm>
+        </p:grpSpPr>
+        <p:grpSp>
+          <p:nvGrpSpPr>
+            <p:cNvPr id="3" name="Group 2"/>
+            <p:cNvGrpSpPr/>
+            <p:nvPr/>
+          </p:nvGrpSpPr>
+          <p:grpSpPr>
+            <a:xfrm>
+              <a:off x="685800" y="990600"/>
+              <a:ext cx="8269288" cy="4510087"/>
+              <a:chOff x="685800" y="990600"/>
+              <a:chExt cx="8269288" cy="4510087"/>
+            </a:xfrm>
+          </p:grpSpPr>
+          <p:sp>
+            <p:nvSpPr>
+              <p:cNvPr id="2" name="Rectangle 1"/>
+              <p:cNvSpPr/>
+              <p:nvPr/>
+            </p:nvSpPr>
+            <p:spPr>
+              <a:xfrm>
+                <a:off x="685800" y="990600"/>
+                <a:ext cx="8269288" cy="4510087"/>
+              </a:xfrm>
+              <a:prstGeom prst="rect">
+                <a:avLst/>
+              </a:prstGeom>
+              <a:solidFill>
+                <a:schemeClr val="bg1"/>
+              </a:solidFill>
+              <a:ln>
+                <a:solidFill>
+                  <a:schemeClr val="bg1"/>
+                </a:solidFill>
+              </a:ln>
+            </p:spPr>
+            <p:style>
+              <a:lnRef idx="2">
+                <a:schemeClr val="accent1">
+                  <a:shade val="50000"/>
+                </a:schemeClr>
+              </a:lnRef>
+              <a:fillRef idx="1">
+                <a:schemeClr val="accent1"/>
+              </a:fillRef>
+              <a:effectRef idx="0">
+                <a:schemeClr val="accent1"/>
+              </a:effectRef>
+              <a:fontRef idx="minor">
+                <a:schemeClr val="lt1"/>
+              </a:fontRef>
+            </p:style>
+            <p:txBody>
+              <a:bodyPr rtlCol="0" anchor="ctr"/>
+              <a:lstStyle/>
+              <a:p>
+                <a:pPr algn="ctr"/>
+                <a:endParaRPr lang="en-US"/>
+              </a:p>
+            </p:txBody>
+          </p:sp>
+          <p:pic>
+            <p:nvPicPr>
+              <p:cNvPr id="4098" name="Picture 2" descr="C:\Users\T410\Desktop\2015-01-24  Auditory Steady State Response (EEG Hacker, OpenBCI)\Results-EyesOpen.png"/>
+              <p:cNvPicPr>
+                <a:picLocks noChangeAspect="1" noChangeArrowheads="1"/>
+              </p:cNvPicPr>
+              <p:nvPr/>
+            </p:nvPicPr>
+            <p:blipFill>
+              <a:blip r:embed="rId2">
+                <a:extLst>
+                  <a:ext uri="{28A0092B-C50C-407E-A947-70E740481C1C}">
+                    <a14:useLocalDpi xmlns:a14="http://schemas.microsoft.com/office/drawing/2010/main" val="0"/>
+                  </a:ext>
+                </a:extLst>
+              </a:blip>
+              <a:srcRect/>
+              <a:stretch>
+                <a:fillRect/>
+              </a:stretch>
+            </p:blipFill>
+            <p:spPr bwMode="auto">
+              <a:xfrm>
+                <a:off x="685800" y="990600"/>
+                <a:ext cx="8269288" cy="4510087"/>
+              </a:xfrm>
+              <a:prstGeom prst="rect">
+                <a:avLst/>
+              </a:prstGeom>
+              <a:noFill/>
+              <a:extLst>
+                <a:ext uri="{909E8E84-426E-40DD-AFC4-6F175D3DCCD1}">
+                  <a14:hiddenFill xmlns:a14="http://schemas.microsoft.com/office/drawing/2010/main">
+                    <a:solidFill>
+                      <a:srgbClr val="FFFFFF"/>
+                    </a:solidFill>
+                  </a14:hiddenFill>
+                </a:ext>
+              </a:extLst>
+            </p:spPr>
+          </p:pic>
+        </p:grpSp>
+        <p:sp>
+          <p:nvSpPr>
+            <p:cNvPr id="5" name="TextBox 4"/>
+            <p:cNvSpPr txBox="1"/>
+            <p:nvPr/>
+          </p:nvSpPr>
+          <p:spPr>
+            <a:xfrm>
+              <a:off x="4035455" y="1737053"/>
+              <a:ext cx="1167307" cy="461665"/>
+            </a:xfrm>
+            <a:prstGeom prst="rect">
+              <a:avLst/>
+            </a:prstGeom>
+            <a:solidFill>
+              <a:schemeClr val="bg1"/>
+            </a:solidFill>
+          </p:spPr>
+          <p:txBody>
+            <a:bodyPr wrap="none" rtlCol="0">
+              <a:spAutoFit/>
+            </a:bodyPr>
+            <a:lstStyle/>
+            <a:p>
+              <a:pPr algn="ctr"/>
+              <a:r>
+                <a:rPr lang="en-US" sz="1200" b="1" dirty="0" smtClean="0">
+                  <a:latin typeface="Arial" panose="020B0604020202020204" pitchFamily="34" charset="0"/>
+                  <a:cs typeface="Arial" panose="020B0604020202020204" pitchFamily="34" charset="0"/>
+                </a:rPr>
+                <a:t>No Response</a:t>
+              </a:r>
+            </a:p>
+            <a:p>
+              <a:pPr algn="ctr"/>
+              <a:r>
+                <a:rPr lang="en-US" sz="1200" b="1" dirty="0" smtClean="0">
+                  <a:latin typeface="Arial" panose="020B0604020202020204" pitchFamily="34" charset="0"/>
+                  <a:cs typeface="Arial" panose="020B0604020202020204" pitchFamily="34" charset="0"/>
+                </a:rPr>
+                <a:t>38-42 Hz</a:t>
+              </a:r>
+              <a:endParaRPr lang="en-US" sz="1200" b="1" dirty="0">
+                <a:latin typeface="Arial" panose="020B0604020202020204" pitchFamily="34" charset="0"/>
+                <a:cs typeface="Arial" panose="020B0604020202020204" pitchFamily="34" charset="0"/>
+              </a:endParaRPr>
+            </a:p>
+          </p:txBody>
+        </p:sp>
+        <p:grpSp>
+          <p:nvGrpSpPr>
+            <p:cNvPr id="6" name="Group 5"/>
+            <p:cNvGrpSpPr/>
+            <p:nvPr/>
+          </p:nvGrpSpPr>
+          <p:grpSpPr>
+            <a:xfrm>
+              <a:off x="1828800" y="2243468"/>
+              <a:ext cx="5640410" cy="533400"/>
+              <a:chOff x="1828799" y="2286000"/>
+              <a:chExt cx="5832614" cy="533400"/>
+            </a:xfrm>
+          </p:grpSpPr>
+          <p:sp>
+            <p:nvSpPr>
+              <p:cNvPr id="7" name="Right Brace 6"/>
+              <p:cNvSpPr/>
+              <p:nvPr/>
+            </p:nvSpPr>
+            <p:spPr>
+              <a:xfrm>
+                <a:off x="7467600" y="2296180"/>
+                <a:ext cx="193813" cy="523220"/>
+              </a:xfrm>
+              <a:prstGeom prst="rightBrace">
+                <a:avLst>
+                  <a:gd name="adj1" fmla="val 29203"/>
+                  <a:gd name="adj2" fmla="val 50000"/>
+                </a:avLst>
+              </a:prstGeom>
+              <a:noFill/>
+              <a:ln w="57150">
+                <a:solidFill>
+                  <a:schemeClr val="bg1"/>
+                </a:solidFill>
+              </a:ln>
+            </p:spPr>
+            <p:style>
+              <a:lnRef idx="1">
+                <a:schemeClr val="accent1"/>
+              </a:lnRef>
+              <a:fillRef idx="0">
+                <a:schemeClr val="accent1"/>
+              </a:fillRef>
+              <a:effectRef idx="0">
+                <a:schemeClr val="accent1"/>
+              </a:effectRef>
+              <a:fontRef idx="minor">
+                <a:schemeClr val="tx1"/>
+              </a:fontRef>
+            </p:style>
+            <p:txBody>
+              <a:bodyPr rtlCol="0" anchor="ctr"/>
+              <a:lstStyle/>
+              <a:p>
+                <a:pPr algn="ctr"/>
+                <a:endParaRPr lang="en-US" sz="1600"/>
+              </a:p>
+            </p:txBody>
+          </p:sp>
+          <p:sp>
+            <p:nvSpPr>
+              <p:cNvPr id="8" name="Right Brace 7"/>
+              <p:cNvSpPr/>
+              <p:nvPr/>
+            </p:nvSpPr>
+            <p:spPr>
+              <a:xfrm flipH="1">
+                <a:off x="1828799" y="2296180"/>
+                <a:ext cx="193813" cy="523220"/>
+              </a:xfrm>
+              <a:prstGeom prst="rightBrace">
+                <a:avLst>
+                  <a:gd name="adj1" fmla="val 29203"/>
+                  <a:gd name="adj2" fmla="val 50000"/>
+                </a:avLst>
+              </a:prstGeom>
+              <a:noFill/>
+              <a:ln w="57150">
+                <a:solidFill>
+                  <a:schemeClr val="bg1"/>
+                </a:solidFill>
+              </a:ln>
+            </p:spPr>
+            <p:style>
+              <a:lnRef idx="1">
+                <a:schemeClr val="accent1"/>
+              </a:lnRef>
+              <a:fillRef idx="0">
+                <a:schemeClr val="accent1"/>
+              </a:fillRef>
+              <a:effectRef idx="0">
+                <a:schemeClr val="accent1"/>
+              </a:effectRef>
+              <a:fontRef idx="minor">
+                <a:schemeClr val="tx1"/>
+              </a:fontRef>
+            </p:style>
+            <p:txBody>
+              <a:bodyPr rtlCol="0" anchor="ctr"/>
+              <a:lstStyle/>
+              <a:p>
+                <a:pPr algn="ctr"/>
+                <a:endParaRPr lang="en-US"/>
+              </a:p>
+            </p:txBody>
+          </p:sp>
+          <p:cxnSp>
+            <p:nvCxnSpPr>
+              <p:cNvPr id="9" name="Straight Connector 8"/>
+              <p:cNvCxnSpPr/>
+              <p:nvPr/>
+            </p:nvCxnSpPr>
+            <p:spPr>
+              <a:xfrm>
+                <a:off x="2133600" y="2286000"/>
+                <a:ext cx="5257800" cy="0"/>
+              </a:xfrm>
+              <a:prstGeom prst="line">
+                <a:avLst/>
+              </a:prstGeom>
+              <a:ln w="28575">
+                <a:solidFill>
+                  <a:schemeClr val="bg1"/>
+                </a:solidFill>
+                <a:prstDash val="dash"/>
+              </a:ln>
+            </p:spPr>
+            <p:style>
+              <a:lnRef idx="1">
+                <a:schemeClr val="accent1"/>
+              </a:lnRef>
+              <a:fillRef idx="0">
+                <a:schemeClr val="accent1"/>
+              </a:fillRef>
+              <a:effectRef idx="0">
+                <a:schemeClr val="accent1"/>
+              </a:effectRef>
+              <a:fontRef idx="minor">
+                <a:schemeClr val="tx1"/>
+              </a:fontRef>
+            </p:style>
+          </p:cxnSp>
+          <p:cxnSp>
+            <p:nvCxnSpPr>
+              <p:cNvPr id="10" name="Straight Connector 9"/>
+              <p:cNvCxnSpPr/>
+              <p:nvPr/>
+            </p:nvCxnSpPr>
+            <p:spPr>
+              <a:xfrm>
+                <a:off x="2133600" y="2819400"/>
+                <a:ext cx="5257800" cy="0"/>
+              </a:xfrm>
+              <a:prstGeom prst="line">
+                <a:avLst/>
+              </a:prstGeom>
+              <a:ln w="28575">
+                <a:solidFill>
+                  <a:schemeClr val="bg1"/>
+                </a:solidFill>
+                <a:prstDash val="dash"/>
+              </a:ln>
+            </p:spPr>
+            <p:style>
+              <a:lnRef idx="1">
+                <a:schemeClr val="accent1"/>
+              </a:lnRef>
+              <a:fillRef idx="0">
+                <a:schemeClr val="accent1"/>
+              </a:fillRef>
+              <a:effectRef idx="0">
+                <a:schemeClr val="accent1"/>
+              </a:effectRef>
+              <a:fontRef idx="minor">
+                <a:schemeClr val="tx1"/>
+              </a:fontRef>
+            </p:style>
+          </p:cxnSp>
+        </p:grpSp>
+      </p:grpSp>
+    </p:spTree>
+    <p:extLst>
+      <p:ext uri="{BB962C8B-B14F-4D97-AF65-F5344CB8AC3E}">
+        <p14:creationId xmlns:p14="http://schemas.microsoft.com/office/powerpoint/2010/main" val="4161311226"/>
+      </p:ext>
+    </p:extLst>
+  </p:cSld>
+  <p:clrMapOvr>
+    <a:masterClrMapping/>
+  </p:clrMapOvr>
+</p:sld>
+</file>
+
+<file path=ppt/slides/slide9.xml><?xml version="1.0" encoding="utf-8"?>
+<p:sld xmlns:a="http://schemas.openxmlformats.org/drawingml/2006/main" xmlns:r="http://schemas.openxmlformats.org/officeDocument/2006/relationships" xmlns:p="http://schemas.openxmlformats.org/presentationml/2006/main">
+  <p:cSld>
+    <p:spTree>
+      <p:nvGrpSpPr>
+        <p:cNvPr id="1" name=""/>
+        <p:cNvGrpSpPr/>
+        <p:nvPr/>
+      </p:nvGrpSpPr>
+      <p:grpSpPr>
+        <a:xfrm>
+          <a:off x="0" y="0"/>
+          <a:ext cx="0" cy="0"/>
+          <a:chOff x="0" y="0"/>
+          <a:chExt cx="0" cy="0"/>
+        </a:xfrm>
+      </p:grpSpPr>
+      <p:grpSp>
+        <p:nvGrpSpPr>
+          <p:cNvPr id="4" name="Group 3"/>
+          <p:cNvGrpSpPr/>
+          <p:nvPr/>
+        </p:nvGrpSpPr>
+        <p:grpSpPr>
+          <a:xfrm>
+            <a:off x="838200" y="990600"/>
+            <a:ext cx="7824787" cy="4281488"/>
+            <a:chOff x="838200" y="990600"/>
+            <a:chExt cx="7824787" cy="4281488"/>
+          </a:xfrm>
+        </p:grpSpPr>
+        <p:grpSp>
+          <p:nvGrpSpPr>
+            <p:cNvPr id="3" name="Group 2"/>
+            <p:cNvGrpSpPr/>
+            <p:nvPr/>
+          </p:nvGrpSpPr>
+          <p:grpSpPr>
+            <a:xfrm>
+              <a:off x="838200" y="990600"/>
+              <a:ext cx="7824787" cy="4281488"/>
+              <a:chOff x="838200" y="990600"/>
+              <a:chExt cx="7824787" cy="4281488"/>
+            </a:xfrm>
+          </p:grpSpPr>
+          <p:sp>
+            <p:nvSpPr>
+              <p:cNvPr id="2" name="Rectangle 1"/>
+              <p:cNvSpPr/>
+              <p:nvPr/>
+            </p:nvSpPr>
+            <p:spPr>
+              <a:xfrm>
+                <a:off x="838200" y="990600"/>
+                <a:ext cx="7824787" cy="4281488"/>
+              </a:xfrm>
+              <a:prstGeom prst="rect">
+                <a:avLst/>
+              </a:prstGeom>
+              <a:solidFill>
+                <a:schemeClr val="bg1"/>
+              </a:solidFill>
+              <a:ln>
+                <a:solidFill>
+                  <a:schemeClr val="bg1"/>
+                </a:solidFill>
+              </a:ln>
+            </p:spPr>
+            <p:style>
+              <a:lnRef idx="2">
+                <a:schemeClr val="accent1">
+                  <a:shade val="50000"/>
+                </a:schemeClr>
+              </a:lnRef>
+              <a:fillRef idx="1">
+                <a:schemeClr val="accent1"/>
+              </a:fillRef>
+              <a:effectRef idx="0">
+                <a:schemeClr val="accent1"/>
+              </a:effectRef>
+              <a:fontRef idx="minor">
+                <a:schemeClr val="lt1"/>
+              </a:fontRef>
+            </p:style>
+            <p:txBody>
+              <a:bodyPr rtlCol="0" anchor="ctr"/>
+              <a:lstStyle/>
+              <a:p>
+                <a:pPr algn="ctr"/>
+                <a:endParaRPr lang="en-US"/>
+              </a:p>
+            </p:txBody>
+          </p:sp>
+          <p:pic>
+            <p:nvPicPr>
+              <p:cNvPr id="5122" name="Picture 2" descr="C:\Users\T410\Desktop\2015-01-24  Auditory Steady State Response (EEG Hacker, OpenBCI)\Spectrum-EyesOpen.png"/>
+              <p:cNvPicPr>
+                <a:picLocks noChangeAspect="1" noChangeArrowheads="1"/>
+              </p:cNvPicPr>
+              <p:nvPr/>
+            </p:nvPicPr>
+            <p:blipFill>
+              <a:blip r:embed="rId2">
+                <a:extLst>
+                  <a:ext uri="{28A0092B-C50C-407E-A947-70E740481C1C}">
+                    <a14:useLocalDpi xmlns:a14="http://schemas.microsoft.com/office/drawing/2010/main" val="0"/>
+                  </a:ext>
+                </a:extLst>
+              </a:blip>
+              <a:srcRect/>
+              <a:stretch>
+                <a:fillRect/>
+              </a:stretch>
+            </p:blipFill>
+            <p:spPr bwMode="auto">
+              <a:xfrm>
+                <a:off x="838200" y="990600"/>
+                <a:ext cx="7824787" cy="4281488"/>
+              </a:xfrm>
+              <a:prstGeom prst="rect">
+                <a:avLst/>
+              </a:prstGeom>
+              <a:noFill/>
+              <a:extLst>
+                <a:ext uri="{909E8E84-426E-40DD-AFC4-6F175D3DCCD1}">
+                  <a14:hiddenFill xmlns:a14="http://schemas.microsoft.com/office/drawing/2010/main">
+                    <a:solidFill>
+                      <a:srgbClr val="FFFFFF"/>
+                    </a:solidFill>
+                  </a14:hiddenFill>
+                </a:ext>
+              </a:extLst>
+            </p:spPr>
+          </p:pic>
+        </p:grpSp>
+        <p:sp>
+          <p:nvSpPr>
+            <p:cNvPr id="5" name="TextBox 4"/>
+            <p:cNvSpPr txBox="1"/>
+            <p:nvPr/>
+          </p:nvSpPr>
+          <p:spPr>
+            <a:xfrm>
+              <a:off x="5575741" y="2591639"/>
+              <a:ext cx="1106393" cy="584775"/>
+            </a:xfrm>
+            <a:prstGeom prst="rect">
+              <a:avLst/>
+            </a:prstGeom>
+            <a:solidFill>
+              <a:schemeClr val="bg1"/>
+            </a:solidFill>
+          </p:spPr>
+          <p:txBody>
+            <a:bodyPr wrap="none" rtlCol="0">
+              <a:spAutoFit/>
+            </a:bodyPr>
+            <a:lstStyle/>
+            <a:p>
+              <a:pPr algn="ctr"/>
+              <a:r>
+                <a:rPr lang="en-US" sz="1600" b="1" dirty="0" smtClean="0">
+                  <a:latin typeface="Arial" panose="020B0604020202020204" pitchFamily="34" charset="0"/>
+                  <a:cs typeface="Arial" panose="020B0604020202020204" pitchFamily="34" charset="0"/>
+                </a:rPr>
+                <a:t>No Peaks</a:t>
+              </a:r>
+            </a:p>
+            <a:p>
+              <a:pPr algn="ctr"/>
+              <a:r>
+                <a:rPr lang="en-US" sz="1600" b="1" dirty="0" smtClean="0">
+                  <a:latin typeface="Arial" panose="020B0604020202020204" pitchFamily="34" charset="0"/>
+                  <a:cs typeface="Arial" panose="020B0604020202020204" pitchFamily="34" charset="0"/>
+                </a:rPr>
+                <a:t>38-42 Hz</a:t>
+              </a:r>
+              <a:endParaRPr lang="en-US" sz="1600" b="1" dirty="0">
+                <a:latin typeface="Arial" panose="020B0604020202020204" pitchFamily="34" charset="0"/>
+                <a:cs typeface="Arial" panose="020B0604020202020204" pitchFamily="34" charset="0"/>
+              </a:endParaRPr>
+            </a:p>
+          </p:txBody>
+        </p:sp>
+      </p:grpSp>
+    </p:spTree>
+    <p:extLst>
+      <p:ext uri="{BB962C8B-B14F-4D97-AF65-F5344CB8AC3E}">
+        <p14:creationId xmlns:p14="http://schemas.microsoft.com/office/powerpoint/2010/main" val="2748881508"/>
+      </p:ext>
+    </p:extLst>
+  </p:cSld>
+  <p:clrMapOvr>
+    <a:masterClrMapping/>
+  </p:clrMapOvr>
+</p:sld>
+</file>
+
 <file path=ppt/theme/theme1.xml><?xml version="1.0" encoding="utf-8"?>
 <a:theme xmlns:a="http://schemas.openxmlformats.org/drawingml/2006/main" name="Office Theme">
   <a:themeElements>

</xml_diff>